<commit_message>
modify PPT1 graph 新增新增nopromising
</commit_message>
<xml_diff>
--- a/Job Scheduling/assignment/graph.pptx
+++ b/Job Scheduling/assignment/graph.pptx
@@ -3010,21 +3010,21 @@
                 <a:gridCol w="873044">
                   <a:extLst>
                     <a:ext uri="{9D8B030D-6E8A-4147-A177-3AD203B41FA5}">
-                      <a16:colId xmlns="" xmlns:a16="http://schemas.microsoft.com/office/drawing/2014/main" val="1842320837"/>
+                      <a16:colId xmlns:a16="http://schemas.microsoft.com/office/drawing/2014/main" xmlns="" val="1842320837"/>
                     </a:ext>
                   </a:extLst>
                 </a:gridCol>
                 <a:gridCol w="717388">
                   <a:extLst>
                     <a:ext uri="{9D8B030D-6E8A-4147-A177-3AD203B41FA5}">
-                      <a16:colId xmlns="" xmlns:a16="http://schemas.microsoft.com/office/drawing/2014/main" val="2038016994"/>
+                      <a16:colId xmlns:a16="http://schemas.microsoft.com/office/drawing/2014/main" xmlns="" val="2038016994"/>
                     </a:ext>
                   </a:extLst>
                 </a:gridCol>
                 <a:gridCol w="1028699">
                   <a:extLst>
                     <a:ext uri="{9D8B030D-6E8A-4147-A177-3AD203B41FA5}">
-                      <a16:colId xmlns="" xmlns:a16="http://schemas.microsoft.com/office/drawing/2014/main" val="3728435139"/>
+                      <a16:colId xmlns:a16="http://schemas.microsoft.com/office/drawing/2014/main" xmlns="" val="3728435139"/>
                     </a:ext>
                   </a:extLst>
                 </a:gridCol>
@@ -3077,7 +3077,7 @@
                 </a:tc>
                 <a:extLst>
                   <a:ext uri="{0D108BD9-81ED-4DB2-BD59-A6C34878D82A}">
-                    <a16:rowId xmlns="" xmlns:a16="http://schemas.microsoft.com/office/drawing/2014/main" val="1025974938"/>
+                    <a16:rowId xmlns:a16="http://schemas.microsoft.com/office/drawing/2014/main" xmlns="" val="1025974938"/>
                   </a:ext>
                 </a:extLst>
               </a:tr>
@@ -3129,7 +3129,7 @@
                 </a:tc>
                 <a:extLst>
                   <a:ext uri="{0D108BD9-81ED-4DB2-BD59-A6C34878D82A}">
-                    <a16:rowId xmlns="" xmlns:a16="http://schemas.microsoft.com/office/drawing/2014/main" val="4077566409"/>
+                    <a16:rowId xmlns:a16="http://schemas.microsoft.com/office/drawing/2014/main" xmlns="" val="4077566409"/>
                   </a:ext>
                 </a:extLst>
               </a:tr>
@@ -3181,7 +3181,7 @@
                 </a:tc>
                 <a:extLst>
                   <a:ext uri="{0D108BD9-81ED-4DB2-BD59-A6C34878D82A}">
-                    <a16:rowId xmlns="" xmlns:a16="http://schemas.microsoft.com/office/drawing/2014/main" val="4214053569"/>
+                    <a16:rowId xmlns:a16="http://schemas.microsoft.com/office/drawing/2014/main" xmlns="" val="4214053569"/>
                   </a:ext>
                 </a:extLst>
               </a:tr>
@@ -3233,7 +3233,7 @@
                 </a:tc>
                 <a:extLst>
                   <a:ext uri="{0D108BD9-81ED-4DB2-BD59-A6C34878D82A}">
-                    <a16:rowId xmlns="" xmlns:a16="http://schemas.microsoft.com/office/drawing/2014/main" val="3475086053"/>
+                    <a16:rowId xmlns:a16="http://schemas.microsoft.com/office/drawing/2014/main" xmlns="" val="3475086053"/>
                   </a:ext>
                 </a:extLst>
               </a:tr>
@@ -3285,7 +3285,7 @@
                 </a:tc>
                 <a:extLst>
                   <a:ext uri="{0D108BD9-81ED-4DB2-BD59-A6C34878D82A}">
-                    <a16:rowId xmlns="" xmlns:a16="http://schemas.microsoft.com/office/drawing/2014/main" val="3245955256"/>
+                    <a16:rowId xmlns:a16="http://schemas.microsoft.com/office/drawing/2014/main" xmlns="" val="3245955256"/>
                   </a:ext>
                 </a:extLst>
               </a:tr>
@@ -3337,7 +3337,7 @@
                 </a:tc>
                 <a:extLst>
                   <a:ext uri="{0D108BD9-81ED-4DB2-BD59-A6C34878D82A}">
-                    <a16:rowId xmlns="" xmlns:a16="http://schemas.microsoft.com/office/drawing/2014/main" val="1233959304"/>
+                    <a16:rowId xmlns:a16="http://schemas.microsoft.com/office/drawing/2014/main" xmlns="" val="1233959304"/>
                   </a:ext>
                 </a:extLst>
               </a:tr>
@@ -4681,21 +4681,21 @@
                 <a:gridCol w="873044">
                   <a:extLst>
                     <a:ext uri="{9D8B030D-6E8A-4147-A177-3AD203B41FA5}">
-                      <a16:colId xmlns="" xmlns:a16="http://schemas.microsoft.com/office/drawing/2014/main" val="1842320837"/>
+                      <a16:colId xmlns:a16="http://schemas.microsoft.com/office/drawing/2014/main" xmlns="" val="1842320837"/>
                     </a:ext>
                   </a:extLst>
                 </a:gridCol>
                 <a:gridCol w="717388">
                   <a:extLst>
                     <a:ext uri="{9D8B030D-6E8A-4147-A177-3AD203B41FA5}">
-                      <a16:colId xmlns="" xmlns:a16="http://schemas.microsoft.com/office/drawing/2014/main" val="2038016994"/>
+                      <a16:colId xmlns:a16="http://schemas.microsoft.com/office/drawing/2014/main" xmlns="" val="2038016994"/>
                     </a:ext>
                   </a:extLst>
                 </a:gridCol>
                 <a:gridCol w="1028699">
                   <a:extLst>
                     <a:ext uri="{9D8B030D-6E8A-4147-A177-3AD203B41FA5}">
-                      <a16:colId xmlns="" xmlns:a16="http://schemas.microsoft.com/office/drawing/2014/main" val="3728435139"/>
+                      <a16:colId xmlns:a16="http://schemas.microsoft.com/office/drawing/2014/main" xmlns="" val="3728435139"/>
                     </a:ext>
                   </a:extLst>
                 </a:gridCol>
@@ -4748,7 +4748,7 @@
                 </a:tc>
                 <a:extLst>
                   <a:ext uri="{0D108BD9-81ED-4DB2-BD59-A6C34878D82A}">
-                    <a16:rowId xmlns="" xmlns:a16="http://schemas.microsoft.com/office/drawing/2014/main" val="1025974938"/>
+                    <a16:rowId xmlns:a16="http://schemas.microsoft.com/office/drawing/2014/main" xmlns="" val="1025974938"/>
                   </a:ext>
                 </a:extLst>
               </a:tr>
@@ -4800,7 +4800,7 @@
                 </a:tc>
                 <a:extLst>
                   <a:ext uri="{0D108BD9-81ED-4DB2-BD59-A6C34878D82A}">
-                    <a16:rowId xmlns="" xmlns:a16="http://schemas.microsoft.com/office/drawing/2014/main" val="4077566409"/>
+                    <a16:rowId xmlns:a16="http://schemas.microsoft.com/office/drawing/2014/main" xmlns="" val="4077566409"/>
                   </a:ext>
                 </a:extLst>
               </a:tr>
@@ -4852,7 +4852,7 @@
                 </a:tc>
                 <a:extLst>
                   <a:ext uri="{0D108BD9-81ED-4DB2-BD59-A6C34878D82A}">
-                    <a16:rowId xmlns="" xmlns:a16="http://schemas.microsoft.com/office/drawing/2014/main" val="4214053569"/>
+                    <a16:rowId xmlns:a16="http://schemas.microsoft.com/office/drawing/2014/main" xmlns="" val="4214053569"/>
                   </a:ext>
                 </a:extLst>
               </a:tr>
@@ -4904,7 +4904,7 @@
                 </a:tc>
                 <a:extLst>
                   <a:ext uri="{0D108BD9-81ED-4DB2-BD59-A6C34878D82A}">
-                    <a16:rowId xmlns="" xmlns:a16="http://schemas.microsoft.com/office/drawing/2014/main" val="3475086053"/>
+                    <a16:rowId xmlns:a16="http://schemas.microsoft.com/office/drawing/2014/main" xmlns="" val="3475086053"/>
                   </a:ext>
                 </a:extLst>
               </a:tr>
@@ -4956,7 +4956,7 @@
                 </a:tc>
                 <a:extLst>
                   <a:ext uri="{0D108BD9-81ED-4DB2-BD59-A6C34878D82A}">
-                    <a16:rowId xmlns="" xmlns:a16="http://schemas.microsoft.com/office/drawing/2014/main" val="3245955256"/>
+                    <a16:rowId xmlns:a16="http://schemas.microsoft.com/office/drawing/2014/main" xmlns="" val="3245955256"/>
                   </a:ext>
                 </a:extLst>
               </a:tr>
@@ -5008,7 +5008,7 @@
                 </a:tc>
                 <a:extLst>
                   <a:ext uri="{0D108BD9-81ED-4DB2-BD59-A6C34878D82A}">
-                    <a16:rowId xmlns="" xmlns:a16="http://schemas.microsoft.com/office/drawing/2014/main" val="1233959304"/>
+                    <a16:rowId xmlns:a16="http://schemas.microsoft.com/office/drawing/2014/main" xmlns="" val="1233959304"/>
                   </a:ext>
                 </a:extLst>
               </a:tr>
@@ -7978,21 +7978,21 @@
                 <a:gridCol w="873044">
                   <a:extLst>
                     <a:ext uri="{9D8B030D-6E8A-4147-A177-3AD203B41FA5}">
-                      <a16:colId xmlns="" xmlns:a16="http://schemas.microsoft.com/office/drawing/2014/main" val="1842320837"/>
+                      <a16:colId xmlns:a16="http://schemas.microsoft.com/office/drawing/2014/main" xmlns="" val="1842320837"/>
                     </a:ext>
                   </a:extLst>
                 </a:gridCol>
                 <a:gridCol w="717388">
                   <a:extLst>
                     <a:ext uri="{9D8B030D-6E8A-4147-A177-3AD203B41FA5}">
-                      <a16:colId xmlns="" xmlns:a16="http://schemas.microsoft.com/office/drawing/2014/main" val="2038016994"/>
+                      <a16:colId xmlns:a16="http://schemas.microsoft.com/office/drawing/2014/main" xmlns="" val="2038016994"/>
                     </a:ext>
                   </a:extLst>
                 </a:gridCol>
                 <a:gridCol w="1028699">
                   <a:extLst>
                     <a:ext uri="{9D8B030D-6E8A-4147-A177-3AD203B41FA5}">
-                      <a16:colId xmlns="" xmlns:a16="http://schemas.microsoft.com/office/drawing/2014/main" val="3728435139"/>
+                      <a16:colId xmlns:a16="http://schemas.microsoft.com/office/drawing/2014/main" xmlns="" val="3728435139"/>
                     </a:ext>
                   </a:extLst>
                 </a:gridCol>
@@ -8045,7 +8045,7 @@
                 </a:tc>
                 <a:extLst>
                   <a:ext uri="{0D108BD9-81ED-4DB2-BD59-A6C34878D82A}">
-                    <a16:rowId xmlns="" xmlns:a16="http://schemas.microsoft.com/office/drawing/2014/main" val="1025974938"/>
+                    <a16:rowId xmlns:a16="http://schemas.microsoft.com/office/drawing/2014/main" xmlns="" val="1025974938"/>
                   </a:ext>
                 </a:extLst>
               </a:tr>
@@ -8097,7 +8097,7 @@
                 </a:tc>
                 <a:extLst>
                   <a:ext uri="{0D108BD9-81ED-4DB2-BD59-A6C34878D82A}">
-                    <a16:rowId xmlns="" xmlns:a16="http://schemas.microsoft.com/office/drawing/2014/main" val="4077566409"/>
+                    <a16:rowId xmlns:a16="http://schemas.microsoft.com/office/drawing/2014/main" xmlns="" val="4077566409"/>
                   </a:ext>
                 </a:extLst>
               </a:tr>
@@ -8149,7 +8149,7 @@
                 </a:tc>
                 <a:extLst>
                   <a:ext uri="{0D108BD9-81ED-4DB2-BD59-A6C34878D82A}">
-                    <a16:rowId xmlns="" xmlns:a16="http://schemas.microsoft.com/office/drawing/2014/main" val="4214053569"/>
+                    <a16:rowId xmlns:a16="http://schemas.microsoft.com/office/drawing/2014/main" xmlns="" val="4214053569"/>
                   </a:ext>
                 </a:extLst>
               </a:tr>
@@ -8201,7 +8201,7 @@
                 </a:tc>
                 <a:extLst>
                   <a:ext uri="{0D108BD9-81ED-4DB2-BD59-A6C34878D82A}">
-                    <a16:rowId xmlns="" xmlns:a16="http://schemas.microsoft.com/office/drawing/2014/main" val="3475086053"/>
+                    <a16:rowId xmlns:a16="http://schemas.microsoft.com/office/drawing/2014/main" xmlns="" val="3475086053"/>
                   </a:ext>
                 </a:extLst>
               </a:tr>
@@ -8253,7 +8253,7 @@
                 </a:tc>
                 <a:extLst>
                   <a:ext uri="{0D108BD9-81ED-4DB2-BD59-A6C34878D82A}">
-                    <a16:rowId xmlns="" xmlns:a16="http://schemas.microsoft.com/office/drawing/2014/main" val="3245955256"/>
+                    <a16:rowId xmlns:a16="http://schemas.microsoft.com/office/drawing/2014/main" xmlns="" val="3245955256"/>
                   </a:ext>
                 </a:extLst>
               </a:tr>
@@ -8305,7 +8305,7 @@
                 </a:tc>
                 <a:extLst>
                   <a:ext uri="{0D108BD9-81ED-4DB2-BD59-A6C34878D82A}">
-                    <a16:rowId xmlns="" xmlns:a16="http://schemas.microsoft.com/office/drawing/2014/main" val="1233959304"/>
+                    <a16:rowId xmlns:a16="http://schemas.microsoft.com/office/drawing/2014/main" xmlns="" val="1233959304"/>
                   </a:ext>
                 </a:extLst>
               </a:tr>
@@ -11877,21 +11877,21 @@
                 <a:gridCol w="873044">
                   <a:extLst>
                     <a:ext uri="{9D8B030D-6E8A-4147-A177-3AD203B41FA5}">
-                      <a16:colId xmlns="" xmlns:a16="http://schemas.microsoft.com/office/drawing/2014/main" val="1842320837"/>
+                      <a16:colId xmlns:a16="http://schemas.microsoft.com/office/drawing/2014/main" xmlns="" val="1842320837"/>
                     </a:ext>
                   </a:extLst>
                 </a:gridCol>
                 <a:gridCol w="717388">
                   <a:extLst>
                     <a:ext uri="{9D8B030D-6E8A-4147-A177-3AD203B41FA5}">
-                      <a16:colId xmlns="" xmlns:a16="http://schemas.microsoft.com/office/drawing/2014/main" val="2038016994"/>
+                      <a16:colId xmlns:a16="http://schemas.microsoft.com/office/drawing/2014/main" xmlns="" val="2038016994"/>
                     </a:ext>
                   </a:extLst>
                 </a:gridCol>
                 <a:gridCol w="1028699">
                   <a:extLst>
                     <a:ext uri="{9D8B030D-6E8A-4147-A177-3AD203B41FA5}">
-                      <a16:colId xmlns="" xmlns:a16="http://schemas.microsoft.com/office/drawing/2014/main" val="3728435139"/>
+                      <a16:colId xmlns:a16="http://schemas.microsoft.com/office/drawing/2014/main" xmlns="" val="3728435139"/>
                     </a:ext>
                   </a:extLst>
                 </a:gridCol>
@@ -11944,7 +11944,7 @@
                 </a:tc>
                 <a:extLst>
                   <a:ext uri="{0D108BD9-81ED-4DB2-BD59-A6C34878D82A}">
-                    <a16:rowId xmlns="" xmlns:a16="http://schemas.microsoft.com/office/drawing/2014/main" val="1025974938"/>
+                    <a16:rowId xmlns:a16="http://schemas.microsoft.com/office/drawing/2014/main" xmlns="" val="1025974938"/>
                   </a:ext>
                 </a:extLst>
               </a:tr>
@@ -11996,7 +11996,7 @@
                 </a:tc>
                 <a:extLst>
                   <a:ext uri="{0D108BD9-81ED-4DB2-BD59-A6C34878D82A}">
-                    <a16:rowId xmlns="" xmlns:a16="http://schemas.microsoft.com/office/drawing/2014/main" val="4077566409"/>
+                    <a16:rowId xmlns:a16="http://schemas.microsoft.com/office/drawing/2014/main" xmlns="" val="4077566409"/>
                   </a:ext>
                 </a:extLst>
               </a:tr>
@@ -12048,7 +12048,7 @@
                 </a:tc>
                 <a:extLst>
                   <a:ext uri="{0D108BD9-81ED-4DB2-BD59-A6C34878D82A}">
-                    <a16:rowId xmlns="" xmlns:a16="http://schemas.microsoft.com/office/drawing/2014/main" val="4214053569"/>
+                    <a16:rowId xmlns:a16="http://schemas.microsoft.com/office/drawing/2014/main" xmlns="" val="4214053569"/>
                   </a:ext>
                 </a:extLst>
               </a:tr>
@@ -12100,7 +12100,7 @@
                 </a:tc>
                 <a:extLst>
                   <a:ext uri="{0D108BD9-81ED-4DB2-BD59-A6C34878D82A}">
-                    <a16:rowId xmlns="" xmlns:a16="http://schemas.microsoft.com/office/drawing/2014/main" val="3475086053"/>
+                    <a16:rowId xmlns:a16="http://schemas.microsoft.com/office/drawing/2014/main" xmlns="" val="3475086053"/>
                   </a:ext>
                 </a:extLst>
               </a:tr>
@@ -12152,7 +12152,7 @@
                 </a:tc>
                 <a:extLst>
                   <a:ext uri="{0D108BD9-81ED-4DB2-BD59-A6C34878D82A}">
-                    <a16:rowId xmlns="" xmlns:a16="http://schemas.microsoft.com/office/drawing/2014/main" val="3245955256"/>
+                    <a16:rowId xmlns:a16="http://schemas.microsoft.com/office/drawing/2014/main" xmlns="" val="3245955256"/>
                   </a:ext>
                 </a:extLst>
               </a:tr>
@@ -12204,7 +12204,7 @@
                 </a:tc>
                 <a:extLst>
                   <a:ext uri="{0D108BD9-81ED-4DB2-BD59-A6C34878D82A}">
-                    <a16:rowId xmlns="" xmlns:a16="http://schemas.microsoft.com/office/drawing/2014/main" val="1233959304"/>
+                    <a16:rowId xmlns:a16="http://schemas.microsoft.com/office/drawing/2014/main" xmlns="" val="1233959304"/>
                   </a:ext>
                 </a:extLst>
               </a:tr>
@@ -15641,21 +15641,21 @@
                 <a:gridCol w="873044">
                   <a:extLst>
                     <a:ext uri="{9D8B030D-6E8A-4147-A177-3AD203B41FA5}">
-                      <a16:colId xmlns="" xmlns:a16="http://schemas.microsoft.com/office/drawing/2014/main" val="1842320837"/>
+                      <a16:colId xmlns:a16="http://schemas.microsoft.com/office/drawing/2014/main" xmlns="" val="1842320837"/>
                     </a:ext>
                   </a:extLst>
                 </a:gridCol>
                 <a:gridCol w="717388">
                   <a:extLst>
                     <a:ext uri="{9D8B030D-6E8A-4147-A177-3AD203B41FA5}">
-                      <a16:colId xmlns="" xmlns:a16="http://schemas.microsoft.com/office/drawing/2014/main" val="2038016994"/>
+                      <a16:colId xmlns:a16="http://schemas.microsoft.com/office/drawing/2014/main" xmlns="" val="2038016994"/>
                     </a:ext>
                   </a:extLst>
                 </a:gridCol>
                 <a:gridCol w="1028699">
                   <a:extLst>
                     <a:ext uri="{9D8B030D-6E8A-4147-A177-3AD203B41FA5}">
-                      <a16:colId xmlns="" xmlns:a16="http://schemas.microsoft.com/office/drawing/2014/main" val="3728435139"/>
+                      <a16:colId xmlns:a16="http://schemas.microsoft.com/office/drawing/2014/main" xmlns="" val="3728435139"/>
                     </a:ext>
                   </a:extLst>
                 </a:gridCol>
@@ -15708,7 +15708,7 @@
                 </a:tc>
                 <a:extLst>
                   <a:ext uri="{0D108BD9-81ED-4DB2-BD59-A6C34878D82A}">
-                    <a16:rowId xmlns="" xmlns:a16="http://schemas.microsoft.com/office/drawing/2014/main" val="1025974938"/>
+                    <a16:rowId xmlns:a16="http://schemas.microsoft.com/office/drawing/2014/main" xmlns="" val="1025974938"/>
                   </a:ext>
                 </a:extLst>
               </a:tr>
@@ -15760,7 +15760,7 @@
                 </a:tc>
                 <a:extLst>
                   <a:ext uri="{0D108BD9-81ED-4DB2-BD59-A6C34878D82A}">
-                    <a16:rowId xmlns="" xmlns:a16="http://schemas.microsoft.com/office/drawing/2014/main" val="4077566409"/>
+                    <a16:rowId xmlns:a16="http://schemas.microsoft.com/office/drawing/2014/main" xmlns="" val="4077566409"/>
                   </a:ext>
                 </a:extLst>
               </a:tr>
@@ -15812,7 +15812,7 @@
                 </a:tc>
                 <a:extLst>
                   <a:ext uri="{0D108BD9-81ED-4DB2-BD59-A6C34878D82A}">
-                    <a16:rowId xmlns="" xmlns:a16="http://schemas.microsoft.com/office/drawing/2014/main" val="4214053569"/>
+                    <a16:rowId xmlns:a16="http://schemas.microsoft.com/office/drawing/2014/main" xmlns="" val="4214053569"/>
                   </a:ext>
                 </a:extLst>
               </a:tr>
@@ -15864,7 +15864,7 @@
                 </a:tc>
                 <a:extLst>
                   <a:ext uri="{0D108BD9-81ED-4DB2-BD59-A6C34878D82A}">
-                    <a16:rowId xmlns="" xmlns:a16="http://schemas.microsoft.com/office/drawing/2014/main" val="3475086053"/>
+                    <a16:rowId xmlns:a16="http://schemas.microsoft.com/office/drawing/2014/main" xmlns="" val="3475086053"/>
                   </a:ext>
                 </a:extLst>
               </a:tr>
@@ -15916,7 +15916,7 @@
                 </a:tc>
                 <a:extLst>
                   <a:ext uri="{0D108BD9-81ED-4DB2-BD59-A6C34878D82A}">
-                    <a16:rowId xmlns="" xmlns:a16="http://schemas.microsoft.com/office/drawing/2014/main" val="3245955256"/>
+                    <a16:rowId xmlns:a16="http://schemas.microsoft.com/office/drawing/2014/main" xmlns="" val="3245955256"/>
                   </a:ext>
                 </a:extLst>
               </a:tr>
@@ -15968,7 +15968,7 @@
                 </a:tc>
                 <a:extLst>
                   <a:ext uri="{0D108BD9-81ED-4DB2-BD59-A6C34878D82A}">
-                    <a16:rowId xmlns="" xmlns:a16="http://schemas.microsoft.com/office/drawing/2014/main" val="1233959304"/>
+                    <a16:rowId xmlns:a16="http://schemas.microsoft.com/office/drawing/2014/main" xmlns="" val="1233959304"/>
                   </a:ext>
                 </a:extLst>
               </a:tr>
@@ -19952,21 +19952,21 @@
                 <a:gridCol w="873044">
                   <a:extLst>
                     <a:ext uri="{9D8B030D-6E8A-4147-A177-3AD203B41FA5}">
-                      <a16:colId xmlns="" xmlns:a16="http://schemas.microsoft.com/office/drawing/2014/main" val="1842320837"/>
+                      <a16:colId xmlns:a16="http://schemas.microsoft.com/office/drawing/2014/main" xmlns="" val="1842320837"/>
                     </a:ext>
                   </a:extLst>
                 </a:gridCol>
                 <a:gridCol w="717388">
                   <a:extLst>
                     <a:ext uri="{9D8B030D-6E8A-4147-A177-3AD203B41FA5}">
-                      <a16:colId xmlns="" xmlns:a16="http://schemas.microsoft.com/office/drawing/2014/main" val="2038016994"/>
+                      <a16:colId xmlns:a16="http://schemas.microsoft.com/office/drawing/2014/main" xmlns="" val="2038016994"/>
                     </a:ext>
                   </a:extLst>
                 </a:gridCol>
                 <a:gridCol w="1028699">
                   <a:extLst>
                     <a:ext uri="{9D8B030D-6E8A-4147-A177-3AD203B41FA5}">
-                      <a16:colId xmlns="" xmlns:a16="http://schemas.microsoft.com/office/drawing/2014/main" val="3728435139"/>
+                      <a16:colId xmlns:a16="http://schemas.microsoft.com/office/drawing/2014/main" xmlns="" val="3728435139"/>
                     </a:ext>
                   </a:extLst>
                 </a:gridCol>
@@ -20019,7 +20019,7 @@
                 </a:tc>
                 <a:extLst>
                   <a:ext uri="{0D108BD9-81ED-4DB2-BD59-A6C34878D82A}">
-                    <a16:rowId xmlns="" xmlns:a16="http://schemas.microsoft.com/office/drawing/2014/main" val="1025974938"/>
+                    <a16:rowId xmlns:a16="http://schemas.microsoft.com/office/drawing/2014/main" xmlns="" val="1025974938"/>
                   </a:ext>
                 </a:extLst>
               </a:tr>
@@ -20071,7 +20071,7 @@
                 </a:tc>
                 <a:extLst>
                   <a:ext uri="{0D108BD9-81ED-4DB2-BD59-A6C34878D82A}">
-                    <a16:rowId xmlns="" xmlns:a16="http://schemas.microsoft.com/office/drawing/2014/main" val="4077566409"/>
+                    <a16:rowId xmlns:a16="http://schemas.microsoft.com/office/drawing/2014/main" xmlns="" val="4077566409"/>
                   </a:ext>
                 </a:extLst>
               </a:tr>
@@ -20123,7 +20123,7 @@
                 </a:tc>
                 <a:extLst>
                   <a:ext uri="{0D108BD9-81ED-4DB2-BD59-A6C34878D82A}">
-                    <a16:rowId xmlns="" xmlns:a16="http://schemas.microsoft.com/office/drawing/2014/main" val="4214053569"/>
+                    <a16:rowId xmlns:a16="http://schemas.microsoft.com/office/drawing/2014/main" xmlns="" val="4214053569"/>
                   </a:ext>
                 </a:extLst>
               </a:tr>
@@ -20175,7 +20175,7 @@
                 </a:tc>
                 <a:extLst>
                   <a:ext uri="{0D108BD9-81ED-4DB2-BD59-A6C34878D82A}">
-                    <a16:rowId xmlns="" xmlns:a16="http://schemas.microsoft.com/office/drawing/2014/main" val="3475086053"/>
+                    <a16:rowId xmlns:a16="http://schemas.microsoft.com/office/drawing/2014/main" xmlns="" val="3475086053"/>
                   </a:ext>
                 </a:extLst>
               </a:tr>
@@ -20227,7 +20227,7 @@
                 </a:tc>
                 <a:extLst>
                   <a:ext uri="{0D108BD9-81ED-4DB2-BD59-A6C34878D82A}">
-                    <a16:rowId xmlns="" xmlns:a16="http://schemas.microsoft.com/office/drawing/2014/main" val="3245955256"/>
+                    <a16:rowId xmlns:a16="http://schemas.microsoft.com/office/drawing/2014/main" xmlns="" val="3245955256"/>
                   </a:ext>
                 </a:extLst>
               </a:tr>
@@ -20279,7 +20279,7 @@
                 </a:tc>
                 <a:extLst>
                   <a:ext uri="{0D108BD9-81ED-4DB2-BD59-A6C34878D82A}">
-                    <a16:rowId xmlns="" xmlns:a16="http://schemas.microsoft.com/office/drawing/2014/main" val="1233959304"/>
+                    <a16:rowId xmlns:a16="http://schemas.microsoft.com/office/drawing/2014/main" xmlns="" val="1233959304"/>
                   </a:ext>
                 </a:extLst>
               </a:tr>
@@ -24421,21 +24421,21 @@
                 <a:gridCol w="873044">
                   <a:extLst>
                     <a:ext uri="{9D8B030D-6E8A-4147-A177-3AD203B41FA5}">
-                      <a16:colId xmlns="" xmlns:a16="http://schemas.microsoft.com/office/drawing/2014/main" val="1842320837"/>
+                      <a16:colId xmlns:a16="http://schemas.microsoft.com/office/drawing/2014/main" xmlns="" val="1842320837"/>
                     </a:ext>
                   </a:extLst>
                 </a:gridCol>
                 <a:gridCol w="717388">
                   <a:extLst>
                     <a:ext uri="{9D8B030D-6E8A-4147-A177-3AD203B41FA5}">
-                      <a16:colId xmlns="" xmlns:a16="http://schemas.microsoft.com/office/drawing/2014/main" val="2038016994"/>
+                      <a16:colId xmlns:a16="http://schemas.microsoft.com/office/drawing/2014/main" xmlns="" val="2038016994"/>
                     </a:ext>
                   </a:extLst>
                 </a:gridCol>
                 <a:gridCol w="1028699">
                   <a:extLst>
                     <a:ext uri="{9D8B030D-6E8A-4147-A177-3AD203B41FA5}">
-                      <a16:colId xmlns="" xmlns:a16="http://schemas.microsoft.com/office/drawing/2014/main" val="3728435139"/>
+                      <a16:colId xmlns:a16="http://schemas.microsoft.com/office/drawing/2014/main" xmlns="" val="3728435139"/>
                     </a:ext>
                   </a:extLst>
                 </a:gridCol>
@@ -24488,7 +24488,7 @@
                 </a:tc>
                 <a:extLst>
                   <a:ext uri="{0D108BD9-81ED-4DB2-BD59-A6C34878D82A}">
-                    <a16:rowId xmlns="" xmlns:a16="http://schemas.microsoft.com/office/drawing/2014/main" val="1025974938"/>
+                    <a16:rowId xmlns:a16="http://schemas.microsoft.com/office/drawing/2014/main" xmlns="" val="1025974938"/>
                   </a:ext>
                 </a:extLst>
               </a:tr>
@@ -24540,7 +24540,7 @@
                 </a:tc>
                 <a:extLst>
                   <a:ext uri="{0D108BD9-81ED-4DB2-BD59-A6C34878D82A}">
-                    <a16:rowId xmlns="" xmlns:a16="http://schemas.microsoft.com/office/drawing/2014/main" val="4077566409"/>
+                    <a16:rowId xmlns:a16="http://schemas.microsoft.com/office/drawing/2014/main" xmlns="" val="4077566409"/>
                   </a:ext>
                 </a:extLst>
               </a:tr>
@@ -24592,7 +24592,7 @@
                 </a:tc>
                 <a:extLst>
                   <a:ext uri="{0D108BD9-81ED-4DB2-BD59-A6C34878D82A}">
-                    <a16:rowId xmlns="" xmlns:a16="http://schemas.microsoft.com/office/drawing/2014/main" val="4214053569"/>
+                    <a16:rowId xmlns:a16="http://schemas.microsoft.com/office/drawing/2014/main" xmlns="" val="4214053569"/>
                   </a:ext>
                 </a:extLst>
               </a:tr>
@@ -24644,7 +24644,7 @@
                 </a:tc>
                 <a:extLst>
                   <a:ext uri="{0D108BD9-81ED-4DB2-BD59-A6C34878D82A}">
-                    <a16:rowId xmlns="" xmlns:a16="http://schemas.microsoft.com/office/drawing/2014/main" val="3475086053"/>
+                    <a16:rowId xmlns:a16="http://schemas.microsoft.com/office/drawing/2014/main" xmlns="" val="3475086053"/>
                   </a:ext>
                 </a:extLst>
               </a:tr>
@@ -24696,7 +24696,7 @@
                 </a:tc>
                 <a:extLst>
                   <a:ext uri="{0D108BD9-81ED-4DB2-BD59-A6C34878D82A}">
-                    <a16:rowId xmlns="" xmlns:a16="http://schemas.microsoft.com/office/drawing/2014/main" val="3245955256"/>
+                    <a16:rowId xmlns:a16="http://schemas.microsoft.com/office/drawing/2014/main" xmlns="" val="3245955256"/>
                   </a:ext>
                 </a:extLst>
               </a:tr>
@@ -24748,7 +24748,7 @@
                 </a:tc>
                 <a:extLst>
                   <a:ext uri="{0D108BD9-81ED-4DB2-BD59-A6C34878D82A}">
-                    <a16:rowId xmlns="" xmlns:a16="http://schemas.microsoft.com/office/drawing/2014/main" val="1233959304"/>
+                    <a16:rowId xmlns:a16="http://schemas.microsoft.com/office/drawing/2014/main" xmlns="" val="1233959304"/>
                   </a:ext>
                 </a:extLst>
               </a:tr>
@@ -25908,21 +25908,21 @@
                 <a:gridCol w="873044">
                   <a:extLst>
                     <a:ext uri="{9D8B030D-6E8A-4147-A177-3AD203B41FA5}">
-                      <a16:colId xmlns="" xmlns:a16="http://schemas.microsoft.com/office/drawing/2014/main" val="1842320837"/>
+                      <a16:colId xmlns:a16="http://schemas.microsoft.com/office/drawing/2014/main" xmlns="" val="1842320837"/>
                     </a:ext>
                   </a:extLst>
                 </a:gridCol>
                 <a:gridCol w="717388">
                   <a:extLst>
                     <a:ext uri="{9D8B030D-6E8A-4147-A177-3AD203B41FA5}">
-                      <a16:colId xmlns="" xmlns:a16="http://schemas.microsoft.com/office/drawing/2014/main" val="2038016994"/>
+                      <a16:colId xmlns:a16="http://schemas.microsoft.com/office/drawing/2014/main" xmlns="" val="2038016994"/>
                     </a:ext>
                   </a:extLst>
                 </a:gridCol>
                 <a:gridCol w="1028699">
                   <a:extLst>
                     <a:ext uri="{9D8B030D-6E8A-4147-A177-3AD203B41FA5}">
-                      <a16:colId xmlns="" xmlns:a16="http://schemas.microsoft.com/office/drawing/2014/main" val="3728435139"/>
+                      <a16:colId xmlns:a16="http://schemas.microsoft.com/office/drawing/2014/main" xmlns="" val="3728435139"/>
                     </a:ext>
                   </a:extLst>
                 </a:gridCol>
@@ -25975,7 +25975,7 @@
                 </a:tc>
                 <a:extLst>
                   <a:ext uri="{0D108BD9-81ED-4DB2-BD59-A6C34878D82A}">
-                    <a16:rowId xmlns="" xmlns:a16="http://schemas.microsoft.com/office/drawing/2014/main" val="1025974938"/>
+                    <a16:rowId xmlns:a16="http://schemas.microsoft.com/office/drawing/2014/main" xmlns="" val="1025974938"/>
                   </a:ext>
                 </a:extLst>
               </a:tr>
@@ -26027,7 +26027,7 @@
                 </a:tc>
                 <a:extLst>
                   <a:ext uri="{0D108BD9-81ED-4DB2-BD59-A6C34878D82A}">
-                    <a16:rowId xmlns="" xmlns:a16="http://schemas.microsoft.com/office/drawing/2014/main" val="4077566409"/>
+                    <a16:rowId xmlns:a16="http://schemas.microsoft.com/office/drawing/2014/main" xmlns="" val="4077566409"/>
                   </a:ext>
                 </a:extLst>
               </a:tr>
@@ -26079,7 +26079,7 @@
                 </a:tc>
                 <a:extLst>
                   <a:ext uri="{0D108BD9-81ED-4DB2-BD59-A6C34878D82A}">
-                    <a16:rowId xmlns="" xmlns:a16="http://schemas.microsoft.com/office/drawing/2014/main" val="4214053569"/>
+                    <a16:rowId xmlns:a16="http://schemas.microsoft.com/office/drawing/2014/main" xmlns="" val="4214053569"/>
                   </a:ext>
                 </a:extLst>
               </a:tr>
@@ -26131,7 +26131,7 @@
                 </a:tc>
                 <a:extLst>
                   <a:ext uri="{0D108BD9-81ED-4DB2-BD59-A6C34878D82A}">
-                    <a16:rowId xmlns="" xmlns:a16="http://schemas.microsoft.com/office/drawing/2014/main" val="3475086053"/>
+                    <a16:rowId xmlns:a16="http://schemas.microsoft.com/office/drawing/2014/main" xmlns="" val="3475086053"/>
                   </a:ext>
                 </a:extLst>
               </a:tr>
@@ -26183,7 +26183,7 @@
                 </a:tc>
                 <a:extLst>
                   <a:ext uri="{0D108BD9-81ED-4DB2-BD59-A6C34878D82A}">
-                    <a16:rowId xmlns="" xmlns:a16="http://schemas.microsoft.com/office/drawing/2014/main" val="3245955256"/>
+                    <a16:rowId xmlns:a16="http://schemas.microsoft.com/office/drawing/2014/main" xmlns="" val="3245955256"/>
                   </a:ext>
                 </a:extLst>
               </a:tr>
@@ -26235,7 +26235,7 @@
                 </a:tc>
                 <a:extLst>
                   <a:ext uri="{0D108BD9-81ED-4DB2-BD59-A6C34878D82A}">
-                    <a16:rowId xmlns="" xmlns:a16="http://schemas.microsoft.com/office/drawing/2014/main" val="1233959304"/>
+                    <a16:rowId xmlns:a16="http://schemas.microsoft.com/office/drawing/2014/main" xmlns="" val="1233959304"/>
                   </a:ext>
                 </a:extLst>
               </a:tr>
@@ -27622,21 +27622,21 @@
                 <a:gridCol w="873044">
                   <a:extLst>
                     <a:ext uri="{9D8B030D-6E8A-4147-A177-3AD203B41FA5}">
-                      <a16:colId xmlns="" xmlns:a16="http://schemas.microsoft.com/office/drawing/2014/main" val="1842320837"/>
+                      <a16:colId xmlns:a16="http://schemas.microsoft.com/office/drawing/2014/main" xmlns="" val="1842320837"/>
                     </a:ext>
                   </a:extLst>
                 </a:gridCol>
                 <a:gridCol w="717388">
                   <a:extLst>
                     <a:ext uri="{9D8B030D-6E8A-4147-A177-3AD203B41FA5}">
-                      <a16:colId xmlns="" xmlns:a16="http://schemas.microsoft.com/office/drawing/2014/main" val="2038016994"/>
+                      <a16:colId xmlns:a16="http://schemas.microsoft.com/office/drawing/2014/main" xmlns="" val="2038016994"/>
                     </a:ext>
                   </a:extLst>
                 </a:gridCol>
                 <a:gridCol w="1028699">
                   <a:extLst>
                     <a:ext uri="{9D8B030D-6E8A-4147-A177-3AD203B41FA5}">
-                      <a16:colId xmlns="" xmlns:a16="http://schemas.microsoft.com/office/drawing/2014/main" val="3728435139"/>
+                      <a16:colId xmlns:a16="http://schemas.microsoft.com/office/drawing/2014/main" xmlns="" val="3728435139"/>
                     </a:ext>
                   </a:extLst>
                 </a:gridCol>
@@ -27689,7 +27689,7 @@
                 </a:tc>
                 <a:extLst>
                   <a:ext uri="{0D108BD9-81ED-4DB2-BD59-A6C34878D82A}">
-                    <a16:rowId xmlns="" xmlns:a16="http://schemas.microsoft.com/office/drawing/2014/main" val="1025974938"/>
+                    <a16:rowId xmlns:a16="http://schemas.microsoft.com/office/drawing/2014/main" xmlns="" val="1025974938"/>
                   </a:ext>
                 </a:extLst>
               </a:tr>
@@ -27741,7 +27741,7 @@
                 </a:tc>
                 <a:extLst>
                   <a:ext uri="{0D108BD9-81ED-4DB2-BD59-A6C34878D82A}">
-                    <a16:rowId xmlns="" xmlns:a16="http://schemas.microsoft.com/office/drawing/2014/main" val="4077566409"/>
+                    <a16:rowId xmlns:a16="http://schemas.microsoft.com/office/drawing/2014/main" xmlns="" val="4077566409"/>
                   </a:ext>
                 </a:extLst>
               </a:tr>
@@ -27793,7 +27793,7 @@
                 </a:tc>
                 <a:extLst>
                   <a:ext uri="{0D108BD9-81ED-4DB2-BD59-A6C34878D82A}">
-                    <a16:rowId xmlns="" xmlns:a16="http://schemas.microsoft.com/office/drawing/2014/main" val="4214053569"/>
+                    <a16:rowId xmlns:a16="http://schemas.microsoft.com/office/drawing/2014/main" xmlns="" val="4214053569"/>
                   </a:ext>
                 </a:extLst>
               </a:tr>
@@ -27845,7 +27845,7 @@
                 </a:tc>
                 <a:extLst>
                   <a:ext uri="{0D108BD9-81ED-4DB2-BD59-A6C34878D82A}">
-                    <a16:rowId xmlns="" xmlns:a16="http://schemas.microsoft.com/office/drawing/2014/main" val="3475086053"/>
+                    <a16:rowId xmlns:a16="http://schemas.microsoft.com/office/drawing/2014/main" xmlns="" val="3475086053"/>
                   </a:ext>
                 </a:extLst>
               </a:tr>
@@ -27897,7 +27897,7 @@
                 </a:tc>
                 <a:extLst>
                   <a:ext uri="{0D108BD9-81ED-4DB2-BD59-A6C34878D82A}">
-                    <a16:rowId xmlns="" xmlns:a16="http://schemas.microsoft.com/office/drawing/2014/main" val="3245955256"/>
+                    <a16:rowId xmlns:a16="http://schemas.microsoft.com/office/drawing/2014/main" xmlns="" val="3245955256"/>
                   </a:ext>
                 </a:extLst>
               </a:tr>
@@ -27949,7 +27949,7 @@
                 </a:tc>
                 <a:extLst>
                   <a:ext uri="{0D108BD9-81ED-4DB2-BD59-A6C34878D82A}">
-                    <a16:rowId xmlns="" xmlns:a16="http://schemas.microsoft.com/office/drawing/2014/main" val="1233959304"/>
+                    <a16:rowId xmlns:a16="http://schemas.microsoft.com/office/drawing/2014/main" xmlns="" val="1233959304"/>
                   </a:ext>
                 </a:extLst>
               </a:tr>
@@ -29563,21 +29563,21 @@
                 <a:gridCol w="873044">
                   <a:extLst>
                     <a:ext uri="{9D8B030D-6E8A-4147-A177-3AD203B41FA5}">
-                      <a16:colId xmlns="" xmlns:a16="http://schemas.microsoft.com/office/drawing/2014/main" val="1842320837"/>
+                      <a16:colId xmlns:a16="http://schemas.microsoft.com/office/drawing/2014/main" xmlns="" val="1842320837"/>
                     </a:ext>
                   </a:extLst>
                 </a:gridCol>
                 <a:gridCol w="717388">
                   <a:extLst>
                     <a:ext uri="{9D8B030D-6E8A-4147-A177-3AD203B41FA5}">
-                      <a16:colId xmlns="" xmlns:a16="http://schemas.microsoft.com/office/drawing/2014/main" val="2038016994"/>
+                      <a16:colId xmlns:a16="http://schemas.microsoft.com/office/drawing/2014/main" xmlns="" val="2038016994"/>
                     </a:ext>
                   </a:extLst>
                 </a:gridCol>
                 <a:gridCol w="1028699">
                   <a:extLst>
                     <a:ext uri="{9D8B030D-6E8A-4147-A177-3AD203B41FA5}">
-                      <a16:colId xmlns="" xmlns:a16="http://schemas.microsoft.com/office/drawing/2014/main" val="3728435139"/>
+                      <a16:colId xmlns:a16="http://schemas.microsoft.com/office/drawing/2014/main" xmlns="" val="3728435139"/>
                     </a:ext>
                   </a:extLst>
                 </a:gridCol>
@@ -29630,7 +29630,7 @@
                 </a:tc>
                 <a:extLst>
                   <a:ext uri="{0D108BD9-81ED-4DB2-BD59-A6C34878D82A}">
-                    <a16:rowId xmlns="" xmlns:a16="http://schemas.microsoft.com/office/drawing/2014/main" val="1025974938"/>
+                    <a16:rowId xmlns:a16="http://schemas.microsoft.com/office/drawing/2014/main" xmlns="" val="1025974938"/>
                   </a:ext>
                 </a:extLst>
               </a:tr>
@@ -29682,7 +29682,7 @@
                 </a:tc>
                 <a:extLst>
                   <a:ext uri="{0D108BD9-81ED-4DB2-BD59-A6C34878D82A}">
-                    <a16:rowId xmlns="" xmlns:a16="http://schemas.microsoft.com/office/drawing/2014/main" val="4077566409"/>
+                    <a16:rowId xmlns:a16="http://schemas.microsoft.com/office/drawing/2014/main" xmlns="" val="4077566409"/>
                   </a:ext>
                 </a:extLst>
               </a:tr>
@@ -29734,7 +29734,7 @@
                 </a:tc>
                 <a:extLst>
                   <a:ext uri="{0D108BD9-81ED-4DB2-BD59-A6C34878D82A}">
-                    <a16:rowId xmlns="" xmlns:a16="http://schemas.microsoft.com/office/drawing/2014/main" val="4214053569"/>
+                    <a16:rowId xmlns:a16="http://schemas.microsoft.com/office/drawing/2014/main" xmlns="" val="4214053569"/>
                   </a:ext>
                 </a:extLst>
               </a:tr>
@@ -29786,7 +29786,7 @@
                 </a:tc>
                 <a:extLst>
                   <a:ext uri="{0D108BD9-81ED-4DB2-BD59-A6C34878D82A}">
-                    <a16:rowId xmlns="" xmlns:a16="http://schemas.microsoft.com/office/drawing/2014/main" val="3475086053"/>
+                    <a16:rowId xmlns:a16="http://schemas.microsoft.com/office/drawing/2014/main" xmlns="" val="3475086053"/>
                   </a:ext>
                 </a:extLst>
               </a:tr>
@@ -29838,7 +29838,7 @@
                 </a:tc>
                 <a:extLst>
                   <a:ext uri="{0D108BD9-81ED-4DB2-BD59-A6C34878D82A}">
-                    <a16:rowId xmlns="" xmlns:a16="http://schemas.microsoft.com/office/drawing/2014/main" val="3245955256"/>
+                    <a16:rowId xmlns:a16="http://schemas.microsoft.com/office/drawing/2014/main" xmlns="" val="3245955256"/>
                   </a:ext>
                 </a:extLst>
               </a:tr>
@@ -29890,7 +29890,7 @@
                 </a:tc>
                 <a:extLst>
                   <a:ext uri="{0D108BD9-81ED-4DB2-BD59-A6C34878D82A}">
-                    <a16:rowId xmlns="" xmlns:a16="http://schemas.microsoft.com/office/drawing/2014/main" val="1233959304"/>
+                    <a16:rowId xmlns:a16="http://schemas.microsoft.com/office/drawing/2014/main" xmlns="" val="1233959304"/>
                   </a:ext>
                 </a:extLst>
               </a:tr>
@@ -31740,21 +31740,21 @@
                 <a:gridCol w="873044">
                   <a:extLst>
                     <a:ext uri="{9D8B030D-6E8A-4147-A177-3AD203B41FA5}">
-                      <a16:colId xmlns="" xmlns:a16="http://schemas.microsoft.com/office/drawing/2014/main" val="1842320837"/>
+                      <a16:colId xmlns:a16="http://schemas.microsoft.com/office/drawing/2014/main" xmlns="" val="1842320837"/>
                     </a:ext>
                   </a:extLst>
                 </a:gridCol>
                 <a:gridCol w="717388">
                   <a:extLst>
                     <a:ext uri="{9D8B030D-6E8A-4147-A177-3AD203B41FA5}">
-                      <a16:colId xmlns="" xmlns:a16="http://schemas.microsoft.com/office/drawing/2014/main" val="2038016994"/>
+                      <a16:colId xmlns:a16="http://schemas.microsoft.com/office/drawing/2014/main" xmlns="" val="2038016994"/>
                     </a:ext>
                   </a:extLst>
                 </a:gridCol>
                 <a:gridCol w="1028699">
                   <a:extLst>
                     <a:ext uri="{9D8B030D-6E8A-4147-A177-3AD203B41FA5}">
-                      <a16:colId xmlns="" xmlns:a16="http://schemas.microsoft.com/office/drawing/2014/main" val="3728435139"/>
+                      <a16:colId xmlns:a16="http://schemas.microsoft.com/office/drawing/2014/main" xmlns="" val="3728435139"/>
                     </a:ext>
                   </a:extLst>
                 </a:gridCol>
@@ -31807,7 +31807,7 @@
                 </a:tc>
                 <a:extLst>
                   <a:ext uri="{0D108BD9-81ED-4DB2-BD59-A6C34878D82A}">
-                    <a16:rowId xmlns="" xmlns:a16="http://schemas.microsoft.com/office/drawing/2014/main" val="1025974938"/>
+                    <a16:rowId xmlns:a16="http://schemas.microsoft.com/office/drawing/2014/main" xmlns="" val="1025974938"/>
                   </a:ext>
                 </a:extLst>
               </a:tr>
@@ -31859,7 +31859,7 @@
                 </a:tc>
                 <a:extLst>
                   <a:ext uri="{0D108BD9-81ED-4DB2-BD59-A6C34878D82A}">
-                    <a16:rowId xmlns="" xmlns:a16="http://schemas.microsoft.com/office/drawing/2014/main" val="4077566409"/>
+                    <a16:rowId xmlns:a16="http://schemas.microsoft.com/office/drawing/2014/main" xmlns="" val="4077566409"/>
                   </a:ext>
                 </a:extLst>
               </a:tr>
@@ -31911,7 +31911,7 @@
                 </a:tc>
                 <a:extLst>
                   <a:ext uri="{0D108BD9-81ED-4DB2-BD59-A6C34878D82A}">
-                    <a16:rowId xmlns="" xmlns:a16="http://schemas.microsoft.com/office/drawing/2014/main" val="4214053569"/>
+                    <a16:rowId xmlns:a16="http://schemas.microsoft.com/office/drawing/2014/main" xmlns="" val="4214053569"/>
                   </a:ext>
                 </a:extLst>
               </a:tr>
@@ -31963,7 +31963,7 @@
                 </a:tc>
                 <a:extLst>
                   <a:ext uri="{0D108BD9-81ED-4DB2-BD59-A6C34878D82A}">
-                    <a16:rowId xmlns="" xmlns:a16="http://schemas.microsoft.com/office/drawing/2014/main" val="3475086053"/>
+                    <a16:rowId xmlns:a16="http://schemas.microsoft.com/office/drawing/2014/main" xmlns="" val="3475086053"/>
                   </a:ext>
                 </a:extLst>
               </a:tr>
@@ -32015,7 +32015,7 @@
                 </a:tc>
                 <a:extLst>
                   <a:ext uri="{0D108BD9-81ED-4DB2-BD59-A6C34878D82A}">
-                    <a16:rowId xmlns="" xmlns:a16="http://schemas.microsoft.com/office/drawing/2014/main" val="3245955256"/>
+                    <a16:rowId xmlns:a16="http://schemas.microsoft.com/office/drawing/2014/main" xmlns="" val="3245955256"/>
                   </a:ext>
                 </a:extLst>
               </a:tr>
@@ -32067,7 +32067,7 @@
                 </a:tc>
                 <a:extLst>
                   <a:ext uri="{0D108BD9-81ED-4DB2-BD59-A6C34878D82A}">
-                    <a16:rowId xmlns="" xmlns:a16="http://schemas.microsoft.com/office/drawing/2014/main" val="1233959304"/>
+                    <a16:rowId xmlns:a16="http://schemas.microsoft.com/office/drawing/2014/main" xmlns="" val="1233959304"/>
                   </a:ext>
                 </a:extLst>
               </a:tr>
@@ -34486,21 +34486,21 @@
                 <a:gridCol w="873044">
                   <a:extLst>
                     <a:ext uri="{9D8B030D-6E8A-4147-A177-3AD203B41FA5}">
-                      <a16:colId xmlns="" xmlns:a16="http://schemas.microsoft.com/office/drawing/2014/main" val="1842320837"/>
+                      <a16:colId xmlns:a16="http://schemas.microsoft.com/office/drawing/2014/main" xmlns="" val="1842320837"/>
                     </a:ext>
                   </a:extLst>
                 </a:gridCol>
                 <a:gridCol w="717388">
                   <a:extLst>
                     <a:ext uri="{9D8B030D-6E8A-4147-A177-3AD203B41FA5}">
-                      <a16:colId xmlns="" xmlns:a16="http://schemas.microsoft.com/office/drawing/2014/main" val="2038016994"/>
+                      <a16:colId xmlns:a16="http://schemas.microsoft.com/office/drawing/2014/main" xmlns="" val="2038016994"/>
                     </a:ext>
                   </a:extLst>
                 </a:gridCol>
                 <a:gridCol w="1028699">
                   <a:extLst>
                     <a:ext uri="{9D8B030D-6E8A-4147-A177-3AD203B41FA5}">
-                      <a16:colId xmlns="" xmlns:a16="http://schemas.microsoft.com/office/drawing/2014/main" val="3728435139"/>
+                      <a16:colId xmlns:a16="http://schemas.microsoft.com/office/drawing/2014/main" xmlns="" val="3728435139"/>
                     </a:ext>
                   </a:extLst>
                 </a:gridCol>
@@ -34553,7 +34553,7 @@
                 </a:tc>
                 <a:extLst>
                   <a:ext uri="{0D108BD9-81ED-4DB2-BD59-A6C34878D82A}">
-                    <a16:rowId xmlns="" xmlns:a16="http://schemas.microsoft.com/office/drawing/2014/main" val="1025974938"/>
+                    <a16:rowId xmlns:a16="http://schemas.microsoft.com/office/drawing/2014/main" xmlns="" val="1025974938"/>
                   </a:ext>
                 </a:extLst>
               </a:tr>
@@ -34605,7 +34605,7 @@
                 </a:tc>
                 <a:extLst>
                   <a:ext uri="{0D108BD9-81ED-4DB2-BD59-A6C34878D82A}">
-                    <a16:rowId xmlns="" xmlns:a16="http://schemas.microsoft.com/office/drawing/2014/main" val="4077566409"/>
+                    <a16:rowId xmlns:a16="http://schemas.microsoft.com/office/drawing/2014/main" xmlns="" val="4077566409"/>
                   </a:ext>
                 </a:extLst>
               </a:tr>
@@ -34657,7 +34657,7 @@
                 </a:tc>
                 <a:extLst>
                   <a:ext uri="{0D108BD9-81ED-4DB2-BD59-A6C34878D82A}">
-                    <a16:rowId xmlns="" xmlns:a16="http://schemas.microsoft.com/office/drawing/2014/main" val="4214053569"/>
+                    <a16:rowId xmlns:a16="http://schemas.microsoft.com/office/drawing/2014/main" xmlns="" val="4214053569"/>
                   </a:ext>
                 </a:extLst>
               </a:tr>
@@ -34709,7 +34709,7 @@
                 </a:tc>
                 <a:extLst>
                   <a:ext uri="{0D108BD9-81ED-4DB2-BD59-A6C34878D82A}">
-                    <a16:rowId xmlns="" xmlns:a16="http://schemas.microsoft.com/office/drawing/2014/main" val="3475086053"/>
+                    <a16:rowId xmlns:a16="http://schemas.microsoft.com/office/drawing/2014/main" xmlns="" val="3475086053"/>
                   </a:ext>
                 </a:extLst>
               </a:tr>
@@ -34761,7 +34761,7 @@
                 </a:tc>
                 <a:extLst>
                   <a:ext uri="{0D108BD9-81ED-4DB2-BD59-A6C34878D82A}">
-                    <a16:rowId xmlns="" xmlns:a16="http://schemas.microsoft.com/office/drawing/2014/main" val="3245955256"/>
+                    <a16:rowId xmlns:a16="http://schemas.microsoft.com/office/drawing/2014/main" xmlns="" val="3245955256"/>
                   </a:ext>
                 </a:extLst>
               </a:tr>
@@ -34813,7 +34813,7 @@
                 </a:tc>
                 <a:extLst>
                   <a:ext uri="{0D108BD9-81ED-4DB2-BD59-A6C34878D82A}">
-                    <a16:rowId xmlns="" xmlns:a16="http://schemas.microsoft.com/office/drawing/2014/main" val="1233959304"/>
+                    <a16:rowId xmlns:a16="http://schemas.microsoft.com/office/drawing/2014/main" xmlns="" val="1233959304"/>
                   </a:ext>
                 </a:extLst>
               </a:tr>
@@ -37122,21 +37122,21 @@
                 <a:gridCol w="873044">
                   <a:extLst>
                     <a:ext uri="{9D8B030D-6E8A-4147-A177-3AD203B41FA5}">
-                      <a16:colId xmlns="" xmlns:a16="http://schemas.microsoft.com/office/drawing/2014/main" val="1842320837"/>
+                      <a16:colId xmlns:a16="http://schemas.microsoft.com/office/drawing/2014/main" xmlns="" val="1842320837"/>
                     </a:ext>
                   </a:extLst>
                 </a:gridCol>
                 <a:gridCol w="717388">
                   <a:extLst>
                     <a:ext uri="{9D8B030D-6E8A-4147-A177-3AD203B41FA5}">
-                      <a16:colId xmlns="" xmlns:a16="http://schemas.microsoft.com/office/drawing/2014/main" val="2038016994"/>
+                      <a16:colId xmlns:a16="http://schemas.microsoft.com/office/drawing/2014/main" xmlns="" val="2038016994"/>
                     </a:ext>
                   </a:extLst>
                 </a:gridCol>
                 <a:gridCol w="1028699">
                   <a:extLst>
                     <a:ext uri="{9D8B030D-6E8A-4147-A177-3AD203B41FA5}">
-                      <a16:colId xmlns="" xmlns:a16="http://schemas.microsoft.com/office/drawing/2014/main" val="3728435139"/>
+                      <a16:colId xmlns:a16="http://schemas.microsoft.com/office/drawing/2014/main" xmlns="" val="3728435139"/>
                     </a:ext>
                   </a:extLst>
                 </a:gridCol>
@@ -37189,7 +37189,7 @@
                 </a:tc>
                 <a:extLst>
                   <a:ext uri="{0D108BD9-81ED-4DB2-BD59-A6C34878D82A}">
-                    <a16:rowId xmlns="" xmlns:a16="http://schemas.microsoft.com/office/drawing/2014/main" val="1025974938"/>
+                    <a16:rowId xmlns:a16="http://schemas.microsoft.com/office/drawing/2014/main" xmlns="" val="1025974938"/>
                   </a:ext>
                 </a:extLst>
               </a:tr>
@@ -37241,7 +37241,7 @@
                 </a:tc>
                 <a:extLst>
                   <a:ext uri="{0D108BD9-81ED-4DB2-BD59-A6C34878D82A}">
-                    <a16:rowId xmlns="" xmlns:a16="http://schemas.microsoft.com/office/drawing/2014/main" val="4077566409"/>
+                    <a16:rowId xmlns:a16="http://schemas.microsoft.com/office/drawing/2014/main" xmlns="" val="4077566409"/>
                   </a:ext>
                 </a:extLst>
               </a:tr>
@@ -37293,7 +37293,7 @@
                 </a:tc>
                 <a:extLst>
                   <a:ext uri="{0D108BD9-81ED-4DB2-BD59-A6C34878D82A}">
-                    <a16:rowId xmlns="" xmlns:a16="http://schemas.microsoft.com/office/drawing/2014/main" val="4214053569"/>
+                    <a16:rowId xmlns:a16="http://schemas.microsoft.com/office/drawing/2014/main" xmlns="" val="4214053569"/>
                   </a:ext>
                 </a:extLst>
               </a:tr>
@@ -37345,7 +37345,7 @@
                 </a:tc>
                 <a:extLst>
                   <a:ext uri="{0D108BD9-81ED-4DB2-BD59-A6C34878D82A}">
-                    <a16:rowId xmlns="" xmlns:a16="http://schemas.microsoft.com/office/drawing/2014/main" val="3475086053"/>
+                    <a16:rowId xmlns:a16="http://schemas.microsoft.com/office/drawing/2014/main" xmlns="" val="3475086053"/>
                   </a:ext>
                 </a:extLst>
               </a:tr>
@@ -37397,7 +37397,7 @@
                 </a:tc>
                 <a:extLst>
                   <a:ext uri="{0D108BD9-81ED-4DB2-BD59-A6C34878D82A}">
-                    <a16:rowId xmlns="" xmlns:a16="http://schemas.microsoft.com/office/drawing/2014/main" val="3245955256"/>
+                    <a16:rowId xmlns:a16="http://schemas.microsoft.com/office/drawing/2014/main" xmlns="" val="3245955256"/>
                   </a:ext>
                 </a:extLst>
               </a:tr>
@@ -37449,7 +37449,7 @@
                 </a:tc>
                 <a:extLst>
                   <a:ext uri="{0D108BD9-81ED-4DB2-BD59-A6C34878D82A}">
-                    <a16:rowId xmlns="" xmlns:a16="http://schemas.microsoft.com/office/drawing/2014/main" val="1233959304"/>
+                    <a16:rowId xmlns:a16="http://schemas.microsoft.com/office/drawing/2014/main" xmlns="" val="1233959304"/>
                   </a:ext>
                 </a:extLst>
               </a:tr>
@@ -39965,21 +39965,21 @@
                 <a:gridCol w="873044">
                   <a:extLst>
                     <a:ext uri="{9D8B030D-6E8A-4147-A177-3AD203B41FA5}">
-                      <a16:colId xmlns="" xmlns:a16="http://schemas.microsoft.com/office/drawing/2014/main" val="1842320837"/>
+                      <a16:colId xmlns:a16="http://schemas.microsoft.com/office/drawing/2014/main" xmlns="" val="1842320837"/>
                     </a:ext>
                   </a:extLst>
                 </a:gridCol>
                 <a:gridCol w="717388">
                   <a:extLst>
                     <a:ext uri="{9D8B030D-6E8A-4147-A177-3AD203B41FA5}">
-                      <a16:colId xmlns="" xmlns:a16="http://schemas.microsoft.com/office/drawing/2014/main" val="2038016994"/>
+                      <a16:colId xmlns:a16="http://schemas.microsoft.com/office/drawing/2014/main" xmlns="" val="2038016994"/>
                     </a:ext>
                   </a:extLst>
                 </a:gridCol>
                 <a:gridCol w="1028699">
                   <a:extLst>
                     <a:ext uri="{9D8B030D-6E8A-4147-A177-3AD203B41FA5}">
-                      <a16:colId xmlns="" xmlns:a16="http://schemas.microsoft.com/office/drawing/2014/main" val="3728435139"/>
+                      <a16:colId xmlns:a16="http://schemas.microsoft.com/office/drawing/2014/main" xmlns="" val="3728435139"/>
                     </a:ext>
                   </a:extLst>
                 </a:gridCol>
@@ -40032,7 +40032,7 @@
                 </a:tc>
                 <a:extLst>
                   <a:ext uri="{0D108BD9-81ED-4DB2-BD59-A6C34878D82A}">
-                    <a16:rowId xmlns="" xmlns:a16="http://schemas.microsoft.com/office/drawing/2014/main" val="1025974938"/>
+                    <a16:rowId xmlns:a16="http://schemas.microsoft.com/office/drawing/2014/main" xmlns="" val="1025974938"/>
                   </a:ext>
                 </a:extLst>
               </a:tr>
@@ -40084,7 +40084,7 @@
                 </a:tc>
                 <a:extLst>
                   <a:ext uri="{0D108BD9-81ED-4DB2-BD59-A6C34878D82A}">
-                    <a16:rowId xmlns="" xmlns:a16="http://schemas.microsoft.com/office/drawing/2014/main" val="4077566409"/>
+                    <a16:rowId xmlns:a16="http://schemas.microsoft.com/office/drawing/2014/main" xmlns="" val="4077566409"/>
                   </a:ext>
                 </a:extLst>
               </a:tr>
@@ -40136,7 +40136,7 @@
                 </a:tc>
                 <a:extLst>
                   <a:ext uri="{0D108BD9-81ED-4DB2-BD59-A6C34878D82A}">
-                    <a16:rowId xmlns="" xmlns:a16="http://schemas.microsoft.com/office/drawing/2014/main" val="4214053569"/>
+                    <a16:rowId xmlns:a16="http://schemas.microsoft.com/office/drawing/2014/main" xmlns="" val="4214053569"/>
                   </a:ext>
                 </a:extLst>
               </a:tr>
@@ -40188,7 +40188,7 @@
                 </a:tc>
                 <a:extLst>
                   <a:ext uri="{0D108BD9-81ED-4DB2-BD59-A6C34878D82A}">
-                    <a16:rowId xmlns="" xmlns:a16="http://schemas.microsoft.com/office/drawing/2014/main" val="3475086053"/>
+                    <a16:rowId xmlns:a16="http://schemas.microsoft.com/office/drawing/2014/main" xmlns="" val="3475086053"/>
                   </a:ext>
                 </a:extLst>
               </a:tr>
@@ -40240,7 +40240,7 @@
                 </a:tc>
                 <a:extLst>
                   <a:ext uri="{0D108BD9-81ED-4DB2-BD59-A6C34878D82A}">
-                    <a16:rowId xmlns="" xmlns:a16="http://schemas.microsoft.com/office/drawing/2014/main" val="3245955256"/>
+                    <a16:rowId xmlns:a16="http://schemas.microsoft.com/office/drawing/2014/main" xmlns="" val="3245955256"/>
                   </a:ext>
                 </a:extLst>
               </a:tr>
@@ -40292,7 +40292,7 @@
                 </a:tc>
                 <a:extLst>
                   <a:ext uri="{0D108BD9-81ED-4DB2-BD59-A6C34878D82A}">
-                    <a16:rowId xmlns="" xmlns:a16="http://schemas.microsoft.com/office/drawing/2014/main" val="1233959304"/>
+                    <a16:rowId xmlns:a16="http://schemas.microsoft.com/office/drawing/2014/main" xmlns="" val="1233959304"/>
                   </a:ext>
                 </a:extLst>
               </a:tr>

</xml_diff>